<commit_message>
Week01 complete more or less
</commit_message>
<xml_diff>
--- a/Lectures/Week01/Tutorial01.pptx
+++ b/Lectures/Week01/Tutorial01.pptx
@@ -5,17 +5,19 @@
     <p:sldMasterId id="2147483648" r:id="rId1"/>
   </p:sldMasterIdLst>
   <p:notesMasterIdLst>
-    <p:notesMasterId r:id="rId7"/>
+    <p:notesMasterId r:id="rId9"/>
   </p:notesMasterIdLst>
   <p:handoutMasterIdLst>
-    <p:handoutMasterId r:id="rId8"/>
+    <p:handoutMasterId r:id="rId10"/>
   </p:handoutMasterIdLst>
   <p:sldIdLst>
     <p:sldId id="256" r:id="rId2"/>
     <p:sldId id="1024" r:id="rId3"/>
     <p:sldId id="1025" r:id="rId4"/>
     <p:sldId id="1026" r:id="rId5"/>
-    <p:sldId id="1027" r:id="rId6"/>
+    <p:sldId id="1029" r:id="rId6"/>
+    <p:sldId id="1030" r:id="rId7"/>
+    <p:sldId id="1028" r:id="rId8"/>
   </p:sldIdLst>
   <p:sldSz cx="9144000" cy="6858000" type="letter"/>
   <p:notesSz cx="9601200" cy="7315200"/>
@@ -3177,12 +3179,21 @@
           <a:p>
             <a:r>
               <a:rPr lang="en-US" dirty="0"/>
-              <a:t>Installation of miniconda3</a:t>
+              <a:t>Installation of </a:t>
+            </a:r>
+            <a:r>
+              <a:rPr lang="en-US" dirty="0">
+                <a:latin typeface="Courier New" panose="02070309020205020404" pitchFamily="49" charset="0"/>
+                <a:cs typeface="Courier New" panose="02070309020205020404" pitchFamily="49" charset="0"/>
+              </a:rPr>
+              <a:t>miniconda3</a:t>
             </a:r>
             <a:endParaRPr lang="en-US" dirty="0">
               <a:solidFill>
                 <a:schemeClr val="accent1"/>
               </a:solidFill>
+              <a:latin typeface="Courier New" panose="02070309020205020404" pitchFamily="49" charset="0"/>
+              <a:cs typeface="Courier New" panose="02070309020205020404" pitchFamily="49" charset="0"/>
             </a:endParaRPr>
           </a:p>
         </p:txBody>
@@ -3405,7 +3416,15 @@
             </a:pPr>
             <a:r>
               <a:rPr lang="en-US" dirty="0"/>
-              <a:t>Install packages:</a:t>
+              <a:t>Install </a:t>
+            </a:r>
+            <a:r>
+              <a:rPr lang="en-US" dirty="0" err="1"/>
+              <a:t>PyTorch</a:t>
+            </a:r>
+            <a:r>
+              <a:rPr lang="en-US" dirty="0"/>
+              <a:t>:</a:t>
             </a:r>
           </a:p>
           <a:p>
@@ -3850,12 +3869,21 @@
           <a:p>
             <a:r>
               <a:rPr lang="en-US" dirty="0"/>
-              <a:t>Installation of miniconda3</a:t>
+              <a:t>Installation of </a:t>
+            </a:r>
+            <a:r>
+              <a:rPr lang="en-US" dirty="0">
+                <a:latin typeface="Courier New" panose="02070309020205020404" pitchFamily="49" charset="0"/>
+                <a:cs typeface="Courier New" panose="02070309020205020404" pitchFamily="49" charset="0"/>
+              </a:rPr>
+              <a:t>miniconda3</a:t>
             </a:r>
             <a:endParaRPr lang="en-US" dirty="0">
               <a:solidFill>
                 <a:schemeClr val="accent1"/>
               </a:solidFill>
+              <a:latin typeface="Courier New" panose="02070309020205020404" pitchFamily="49" charset="0"/>
+              <a:cs typeface="Courier New" panose="02070309020205020404" pitchFamily="49" charset="0"/>
             </a:endParaRPr>
           </a:p>
         </p:txBody>
@@ -4207,71 +4235,6 @@
             </a:endParaRPr>
           </a:p>
           <a:p>
-            <a:pPr marL="457200" indent="-457200">
-              <a:buFont typeface="+mj-lt"/>
-              <a:buAutoNum type="arabicPeriod" startAt="7"/>
-            </a:pPr>
-            <a:r>
-              <a:rPr lang="en-US" dirty="0">
-                <a:latin typeface="+mn-lt"/>
-                <a:cs typeface="Courier New" panose="02070309020205020404" pitchFamily="49" charset="0"/>
-              </a:rPr>
-              <a:t>Launch </a:t>
-            </a:r>
-            <a:r>
-              <a:rPr lang="en-US" dirty="0" err="1">
-                <a:latin typeface="+mn-lt"/>
-                <a:cs typeface="Courier New" panose="02070309020205020404" pitchFamily="49" charset="0"/>
-              </a:rPr>
-              <a:t>jupyterlab</a:t>
-            </a:r>
-            <a:br>
-              <a:rPr lang="en-US" dirty="0">
-                <a:latin typeface="+mn-lt"/>
-                <a:cs typeface="Courier New" panose="02070309020205020404" pitchFamily="49" charset="0"/>
-              </a:rPr>
-            </a:br>
-            <a:r>
-              <a:rPr lang="en-US" dirty="0">
-                <a:latin typeface="+mn-lt"/>
-                <a:cs typeface="Courier New" panose="02070309020205020404" pitchFamily="49" charset="0"/>
-              </a:rPr>
-              <a:t>In a terminal, which can be iconized afterwards, use the command</a:t>
-            </a:r>
-          </a:p>
-          <a:p>
-            <a:pPr marL="400050" lvl="1" indent="0">
-              <a:buNone/>
-            </a:pPr>
-            <a:r>
-              <a:rPr lang="en-US" dirty="0">
-                <a:latin typeface="+mn-lt"/>
-                <a:cs typeface="Courier New" panose="02070309020205020404" pitchFamily="49" charset="0"/>
-              </a:rPr>
-              <a:t>	</a:t>
-            </a:r>
-            <a:r>
-              <a:rPr lang="en-US" dirty="0" err="1">
-                <a:solidFill>
-                  <a:srgbClr val="0033CC"/>
-                </a:solidFill>
-                <a:latin typeface="Courier New" panose="02070309020205020404" pitchFamily="49" charset="0"/>
-                <a:cs typeface="Courier New" panose="02070309020205020404" pitchFamily="49" charset="0"/>
-              </a:rPr>
-              <a:t>jupyter</a:t>
-            </a:r>
-            <a:r>
-              <a:rPr lang="en-US" dirty="0">
-                <a:solidFill>
-                  <a:srgbClr val="0033CC"/>
-                </a:solidFill>
-                <a:latin typeface="Courier New" panose="02070309020205020404" pitchFamily="49" charset="0"/>
-                <a:cs typeface="Courier New" panose="02070309020205020404" pitchFamily="49" charset="0"/>
-              </a:rPr>
-              <a:t> lab</a:t>
-            </a:r>
-          </a:p>
-          <a:p>
             <a:pPr marL="0" indent="0">
               <a:buNone/>
             </a:pPr>
@@ -4281,18 +4244,6 @@
             <a:pPr marL="457200" indent="-457200">
               <a:buFont typeface="+mj-lt"/>
               <a:buAutoNum type="arabicPeriod" startAt="2"/>
-            </a:pPr>
-            <a:endParaRPr lang="en-US" dirty="0"/>
-          </a:p>
-          <a:p>
-            <a:pPr marL="0" indent="0">
-              <a:buNone/>
-            </a:pPr>
-            <a:endParaRPr lang="en-US" dirty="0"/>
-          </a:p>
-          <a:p>
-            <a:pPr marL="0" indent="0">
-              <a:buNone/>
             </a:pPr>
             <a:endParaRPr lang="en-US" dirty="0"/>
           </a:p>
@@ -4349,7 +4300,7 @@
         <p:cNvPr id="1" name="">
           <a:extLst>
             <a:ext uri="{FF2B5EF4-FFF2-40B4-BE49-F238E27FC236}">
-              <a16:creationId xmlns:a16="http://schemas.microsoft.com/office/drawing/2014/main" id="{8BFA6C7D-CCC2-F5DC-BA81-3DD2AD2FE61C}"/>
+              <a16:creationId xmlns:a16="http://schemas.microsoft.com/office/drawing/2014/main" id="{75608EE4-F47B-3695-6920-685314E02182}"/>
             </a:ext>
           </a:extLst>
         </p:cNvPr>
@@ -4369,7 +4320,7 @@
           <p:cNvPr id="7" name="Title 6">
             <a:extLst>
               <a:ext uri="{FF2B5EF4-FFF2-40B4-BE49-F238E27FC236}">
-                <a16:creationId xmlns:a16="http://schemas.microsoft.com/office/drawing/2014/main" id="{AF8E9751-C13A-DFBF-9E60-560E9E2DF414}"/>
+                <a16:creationId xmlns:a16="http://schemas.microsoft.com/office/drawing/2014/main" id="{A8C3BC68-6068-C028-DC99-DEB59DC56A40}"/>
               </a:ext>
             </a:extLst>
           </p:cNvPr>
@@ -4387,12 +4338,21 @@
           <a:p>
             <a:r>
               <a:rPr lang="en-US" dirty="0"/>
-              <a:t>Tutorial 	1</a:t>
+              <a:t>Installation of </a:t>
+            </a:r>
+            <a:r>
+              <a:rPr lang="en-US" dirty="0" err="1">
+                <a:latin typeface="Courier New" panose="02070309020205020404" pitchFamily="49" charset="0"/>
+                <a:cs typeface="Courier New" panose="02070309020205020404" pitchFamily="49" charset="0"/>
+              </a:rPr>
+              <a:t>mlinphysics</a:t>
             </a:r>
             <a:endParaRPr lang="en-US" dirty="0">
               <a:solidFill>
                 <a:schemeClr val="accent1"/>
               </a:solidFill>
+              <a:latin typeface="Courier New" panose="02070309020205020404" pitchFamily="49" charset="0"/>
+              <a:cs typeface="Courier New" panose="02070309020205020404" pitchFamily="49" charset="0"/>
             </a:endParaRPr>
           </a:p>
         </p:txBody>
@@ -4402,7 +4362,875 @@
           <p:cNvPr id="8" name="Content Placeholder 7">
             <a:extLst>
               <a:ext uri="{FF2B5EF4-FFF2-40B4-BE49-F238E27FC236}">
-                <a16:creationId xmlns:a16="http://schemas.microsoft.com/office/drawing/2014/main" id="{04FDE196-7F4F-E2C3-8839-62D90E12B783}"/>
+                <a16:creationId xmlns:a16="http://schemas.microsoft.com/office/drawing/2014/main" id="{A61081AA-5FFE-B185-15EE-72684D576E13}"/>
+              </a:ext>
+            </a:extLst>
+          </p:cNvPr>
+          <p:cNvSpPr>
+            <a:spLocks noGrp="1"/>
+          </p:cNvSpPr>
+          <p:nvPr>
+            <p:ph idx="1"/>
+          </p:nvPr>
+        </p:nvSpPr>
+        <p:spPr>
+          <a:xfrm>
+            <a:off x="266879" y="1295400"/>
+            <a:ext cx="8572321" cy="4819650"/>
+          </a:xfrm>
+        </p:spPr>
+        <p:txBody>
+          <a:bodyPr/>
+          <a:lstStyle/>
+          <a:p>
+            <a:pPr marL="457200" indent="-457200">
+              <a:buFont typeface="+mj-lt"/>
+              <a:buAutoNum type="arabicPeriod" startAt="7"/>
+            </a:pPr>
+            <a:r>
+              <a:rPr lang="en-US" dirty="0">
+                <a:latin typeface="+mn-lt"/>
+                <a:cs typeface="Courier New" panose="02070309020205020404" pitchFamily="49" charset="0"/>
+              </a:rPr>
+              <a:t>Create a folder for your work this semester (on Linux, macOS)</a:t>
+            </a:r>
+            <a:br>
+              <a:rPr lang="en-US" dirty="0">
+                <a:latin typeface="+mn-lt"/>
+                <a:cs typeface="Courier New" panose="02070309020205020404" pitchFamily="49" charset="0"/>
+              </a:rPr>
+            </a:br>
+            <a:r>
+              <a:rPr lang="en-US" dirty="0">
+                <a:latin typeface="+mn-lt"/>
+                <a:cs typeface="Courier New" panose="02070309020205020404" pitchFamily="49" charset="0"/>
+              </a:rPr>
+              <a:t>	</a:t>
+            </a:r>
+            <a:r>
+              <a:rPr lang="en-US" dirty="0" err="1">
+                <a:solidFill>
+                  <a:srgbClr val="0033CC"/>
+                </a:solidFill>
+                <a:latin typeface="Courier New" panose="02070309020205020404" pitchFamily="49" charset="0"/>
+                <a:cs typeface="Courier New" panose="02070309020205020404" pitchFamily="49" charset="0"/>
+              </a:rPr>
+              <a:t>mkdir</a:t>
+            </a:r>
+            <a:r>
+              <a:rPr lang="en-US" dirty="0">
+                <a:solidFill>
+                  <a:srgbClr val="0033CC"/>
+                </a:solidFill>
+                <a:latin typeface="Courier New" panose="02070309020205020404" pitchFamily="49" charset="0"/>
+                <a:cs typeface="Courier New" panose="02070309020205020404" pitchFamily="49" charset="0"/>
+              </a:rPr>
+              <a:t> </a:t>
+            </a:r>
+            <a:r>
+              <a:rPr lang="en-US" dirty="0" err="1">
+                <a:solidFill>
+                  <a:srgbClr val="0033CC"/>
+                </a:solidFill>
+                <a:latin typeface="Courier New" panose="02070309020205020404" pitchFamily="49" charset="0"/>
+                <a:cs typeface="Courier New" panose="02070309020205020404" pitchFamily="49" charset="0"/>
+              </a:rPr>
+              <a:t>mlprojects</a:t>
+            </a:r>
+            <a:br>
+              <a:rPr lang="en-US" dirty="0">
+                <a:solidFill>
+                  <a:srgbClr val="0033CC"/>
+                </a:solidFill>
+                <a:latin typeface="Courier New" panose="02070309020205020404" pitchFamily="49" charset="0"/>
+                <a:cs typeface="Courier New" panose="02070309020205020404" pitchFamily="49" charset="0"/>
+              </a:rPr>
+            </a:br>
+            <a:r>
+              <a:rPr lang="en-US" dirty="0">
+                <a:solidFill>
+                  <a:srgbClr val="0033CC"/>
+                </a:solidFill>
+                <a:latin typeface="Courier New" panose="02070309020205020404" pitchFamily="49" charset="0"/>
+                <a:cs typeface="Courier New" panose="02070309020205020404" pitchFamily="49" charset="0"/>
+              </a:rPr>
+              <a:t>	cd </a:t>
+            </a:r>
+            <a:r>
+              <a:rPr lang="en-US" dirty="0" err="1">
+                <a:solidFill>
+                  <a:srgbClr val="0033CC"/>
+                </a:solidFill>
+                <a:latin typeface="Courier New" panose="02070309020205020404" pitchFamily="49" charset="0"/>
+                <a:cs typeface="Courier New" panose="02070309020205020404" pitchFamily="49" charset="0"/>
+              </a:rPr>
+              <a:t>mlprojects</a:t>
+            </a:r>
+            <a:br>
+              <a:rPr lang="en-US" dirty="0">
+                <a:solidFill>
+                  <a:srgbClr val="0033CC"/>
+                </a:solidFill>
+                <a:latin typeface="Courier New" panose="02070309020205020404" pitchFamily="49" charset="0"/>
+                <a:cs typeface="Courier New" panose="02070309020205020404" pitchFamily="49" charset="0"/>
+              </a:rPr>
+            </a:br>
+            <a:r>
+              <a:rPr lang="en-US" dirty="0">
+                <a:solidFill>
+                  <a:srgbClr val="0033CC"/>
+                </a:solidFill>
+                <a:latin typeface="Courier New" panose="02070309020205020404" pitchFamily="49" charset="0"/>
+                <a:cs typeface="Courier New" panose="02070309020205020404" pitchFamily="49" charset="0"/>
+              </a:rPr>
+              <a:t>	</a:t>
+            </a:r>
+          </a:p>
+          <a:p>
+            <a:pPr marL="457200" indent="-457200">
+              <a:buFont typeface="+mj-lt"/>
+              <a:buAutoNum type="arabicPeriod" startAt="7"/>
+            </a:pPr>
+            <a:r>
+              <a:rPr lang="en-US" dirty="0">
+                <a:latin typeface="+mn-lt"/>
+                <a:cs typeface="Courier New" panose="02070309020205020404" pitchFamily="49" charset="0"/>
+              </a:rPr>
+              <a:t>Download from GitHub the package </a:t>
+            </a:r>
+            <a:r>
+              <a:rPr lang="en-US" b="1" dirty="0" err="1">
+                <a:solidFill>
+                  <a:srgbClr val="0033CC"/>
+                </a:solidFill>
+                <a:latin typeface="+mn-lt"/>
+                <a:cs typeface="Courier New" panose="02070309020205020404" pitchFamily="49" charset="0"/>
+              </a:rPr>
+              <a:t>mlinphysics</a:t>
+            </a:r>
+            <a:br>
+              <a:rPr lang="en-US" b="1" dirty="0">
+                <a:solidFill>
+                  <a:srgbClr val="0033CC"/>
+                </a:solidFill>
+                <a:latin typeface="+mn-lt"/>
+                <a:cs typeface="Courier New" panose="02070309020205020404" pitchFamily="49" charset="0"/>
+              </a:rPr>
+            </a:br>
+            <a:r>
+              <a:rPr lang="en-US" sz="2000" dirty="0">
+                <a:solidFill>
+                  <a:srgbClr val="0033CC"/>
+                </a:solidFill>
+                <a:latin typeface="Courier New" panose="02070309020205020404" pitchFamily="49" charset="0"/>
+                <a:cs typeface="Courier New" panose="02070309020205020404" pitchFamily="49" charset="0"/>
+              </a:rPr>
+              <a:t>git clone </a:t>
+            </a:r>
+            <a:r>
+              <a:rPr lang="en-US" sz="2000" dirty="0">
+                <a:solidFill>
+                  <a:srgbClr val="CC00CC"/>
+                </a:solidFill>
+                <a:latin typeface="Courier New" panose="02070309020205020404" pitchFamily="49" charset="0"/>
+                <a:cs typeface="Courier New" panose="02070309020205020404" pitchFamily="49" charset="0"/>
+                <a:hlinkClick r:id="rId2">
+                  <a:extLst>
+                    <a:ext uri="{A12FA001-AC4F-418D-AE19-62706E023703}">
+                      <ahyp:hlinkClr xmlns:ahyp="http://schemas.microsoft.com/office/drawing/2018/hyperlinkcolor" val="tx"/>
+                    </a:ext>
+                  </a:extLst>
+                </a:hlinkClick>
+              </a:rPr>
+              <a:t>https://github.com/hbprosper/</a:t>
+            </a:r>
+            <a:r>
+              <a:rPr lang="en-US" sz="2000" dirty="0">
+                <a:solidFill>
+                  <a:srgbClr val="0033CC"/>
+                </a:solidFill>
+                <a:latin typeface="Courier New" panose="02070309020205020404" pitchFamily="49" charset="0"/>
+                <a:cs typeface="Courier New" panose="02070309020205020404" pitchFamily="49" charset="0"/>
+                <a:hlinkClick r:id="rId2">
+                  <a:extLst>
+                    <a:ext uri="{A12FA001-AC4F-418D-AE19-62706E023703}">
+                      <ahyp:hlinkClr xmlns:ahyp="http://schemas.microsoft.com/office/drawing/2018/hyperlinkcolor" val="tx"/>
+                    </a:ext>
+                  </a:extLst>
+                </a:hlinkClick>
+              </a:rPr>
+              <a:t>mlinphysics</a:t>
+            </a:r>
+            <a:br>
+              <a:rPr lang="en-US" sz="2000" dirty="0">
+                <a:solidFill>
+                  <a:srgbClr val="0033CC"/>
+                </a:solidFill>
+                <a:latin typeface="Courier New" panose="02070309020205020404" pitchFamily="49" charset="0"/>
+                <a:cs typeface="Courier New" panose="02070309020205020404" pitchFamily="49" charset="0"/>
+              </a:rPr>
+            </a:br>
+            <a:r>
+              <a:rPr lang="en-US" dirty="0">
+                <a:latin typeface="+mn-lt"/>
+                <a:cs typeface="Courier New" panose="02070309020205020404" pitchFamily="49" charset="0"/>
+              </a:rPr>
+              <a:t>From your </a:t>
+            </a:r>
+            <a:r>
+              <a:rPr lang="en-US" u="sng" dirty="0">
+                <a:latin typeface="+mn-lt"/>
+                <a:cs typeface="Courier New" panose="02070309020205020404" pitchFamily="49" charset="0"/>
+              </a:rPr>
+              <a:t>current</a:t>
+            </a:r>
+            <a:r>
+              <a:rPr lang="en-US" dirty="0">
+                <a:latin typeface="+mn-lt"/>
+                <a:cs typeface="Courier New" panose="02070309020205020404" pitchFamily="49" charset="0"/>
+              </a:rPr>
+              <a:t> folder (e.g., </a:t>
+            </a:r>
+            <a:r>
+              <a:rPr lang="en-US" dirty="0" err="1">
+                <a:latin typeface="+mn-lt"/>
+                <a:cs typeface="Courier New" panose="02070309020205020404" pitchFamily="49" charset="0"/>
+              </a:rPr>
+              <a:t>mlprojects</a:t>
+            </a:r>
+            <a:r>
+              <a:rPr lang="en-US" dirty="0">
+                <a:latin typeface="+mn-lt"/>
+                <a:cs typeface="Courier New" panose="02070309020205020404" pitchFamily="49" charset="0"/>
+              </a:rPr>
+              <a:t>) do</a:t>
+            </a:r>
+            <a:br>
+              <a:rPr lang="en-US" dirty="0">
+                <a:latin typeface="+mn-lt"/>
+                <a:cs typeface="Courier New" panose="02070309020205020404" pitchFamily="49" charset="0"/>
+              </a:rPr>
+            </a:br>
+            <a:r>
+              <a:rPr lang="en-US" dirty="0">
+                <a:solidFill>
+                  <a:srgbClr val="0033CC"/>
+                </a:solidFill>
+                <a:latin typeface="Courier New" panose="02070309020205020404" pitchFamily="49" charset="0"/>
+                <a:cs typeface="Courier New" panose="02070309020205020404" pitchFamily="49" charset="0"/>
+              </a:rPr>
+              <a:t>source </a:t>
+            </a:r>
+            <a:r>
+              <a:rPr lang="en-US" dirty="0" err="1">
+                <a:solidFill>
+                  <a:srgbClr val="0033CC"/>
+                </a:solidFill>
+                <a:latin typeface="Courier New" panose="02070309020205020404" pitchFamily="49" charset="0"/>
+                <a:cs typeface="Courier New" panose="02070309020205020404" pitchFamily="49" charset="0"/>
+              </a:rPr>
+              <a:t>mlinphysics</a:t>
+            </a:r>
+            <a:r>
+              <a:rPr lang="en-US" dirty="0">
+                <a:solidFill>
+                  <a:srgbClr val="0033CC"/>
+                </a:solidFill>
+                <a:latin typeface="Courier New" panose="02070309020205020404" pitchFamily="49" charset="0"/>
+                <a:cs typeface="Courier New" panose="02070309020205020404" pitchFamily="49" charset="0"/>
+              </a:rPr>
+              <a:t>/</a:t>
+            </a:r>
+            <a:r>
+              <a:rPr lang="en-US" dirty="0" err="1">
+                <a:solidFill>
+                  <a:srgbClr val="0033CC"/>
+                </a:solidFill>
+                <a:latin typeface="Courier New" panose="02070309020205020404" pitchFamily="49" charset="0"/>
+                <a:cs typeface="Courier New" panose="02070309020205020404" pitchFamily="49" charset="0"/>
+              </a:rPr>
+              <a:t>setup.sh</a:t>
+            </a:r>
+            <a:r>
+              <a:rPr lang="en-US" dirty="0">
+                <a:solidFill>
+                  <a:srgbClr val="0033CC"/>
+                </a:solidFill>
+                <a:latin typeface="Courier New" panose="02070309020205020404" pitchFamily="49" charset="0"/>
+                <a:cs typeface="Courier New" panose="02070309020205020404" pitchFamily="49" charset="0"/>
+              </a:rPr>
+              <a:t> </a:t>
+            </a:r>
+            <a:r>
+              <a:rPr lang="en-US" dirty="0">
+                <a:latin typeface="+mn-lt"/>
+                <a:cs typeface="Courier New" panose="02070309020205020404" pitchFamily="49" charset="0"/>
+              </a:rPr>
+              <a:t>(for PYTHONPATH)</a:t>
+            </a:r>
+            <a:br>
+              <a:rPr lang="en-US" dirty="0">
+                <a:latin typeface="+mn-lt"/>
+                <a:cs typeface="Courier New" panose="02070309020205020404" pitchFamily="49" charset="0"/>
+              </a:rPr>
+            </a:br>
+            <a:endParaRPr lang="en-US" dirty="0">
+              <a:latin typeface="+mn-lt"/>
+              <a:cs typeface="Courier New" panose="02070309020205020404" pitchFamily="49" charset="0"/>
+            </a:endParaRPr>
+          </a:p>
+          <a:p>
+            <a:pPr marL="457200" indent="-457200">
+              <a:buFont typeface="+mj-lt"/>
+              <a:buAutoNum type="arabicPeriod" startAt="7"/>
+            </a:pPr>
+            <a:r>
+              <a:rPr lang="en-US" dirty="0">
+                <a:latin typeface="+mn-lt"/>
+                <a:cs typeface="Courier New" panose="02070309020205020404" pitchFamily="49" charset="0"/>
+              </a:rPr>
+              <a:t>Navigate to </a:t>
+            </a:r>
+            <a:r>
+              <a:rPr lang="en-US" dirty="0" err="1">
+                <a:solidFill>
+                  <a:srgbClr val="0033CC"/>
+                </a:solidFill>
+                <a:latin typeface="+mn-lt"/>
+                <a:cs typeface="Courier New" panose="02070309020205020404" pitchFamily="49" charset="0"/>
+              </a:rPr>
+              <a:t>mlprojects</a:t>
+            </a:r>
+            <a:r>
+              <a:rPr lang="en-US" dirty="0">
+                <a:latin typeface="+mn-lt"/>
+                <a:cs typeface="Courier New" panose="02070309020205020404" pitchFamily="49" charset="0"/>
+              </a:rPr>
+              <a:t> and launch </a:t>
+            </a:r>
+            <a:r>
+              <a:rPr lang="en-US" b="1" dirty="0" err="1">
+                <a:solidFill>
+                  <a:srgbClr val="0033CC"/>
+                </a:solidFill>
+                <a:latin typeface="+mn-lt"/>
+                <a:cs typeface="Courier New" panose="02070309020205020404" pitchFamily="49" charset="0"/>
+              </a:rPr>
+              <a:t>jupyterlab</a:t>
+            </a:r>
+            <a:r>
+              <a:rPr lang="en-US" dirty="0">
+                <a:latin typeface="+mn-lt"/>
+                <a:cs typeface="Courier New" panose="02070309020205020404" pitchFamily="49" charset="0"/>
+              </a:rPr>
+              <a:t>, </a:t>
+            </a:r>
+            <a:br>
+              <a:rPr lang="en-US" dirty="0">
+                <a:latin typeface="+mn-lt"/>
+                <a:cs typeface="Courier New" panose="02070309020205020404" pitchFamily="49" charset="0"/>
+              </a:rPr>
+            </a:br>
+            <a:r>
+              <a:rPr lang="en-US" dirty="0">
+                <a:latin typeface="+mn-lt"/>
+                <a:cs typeface="Courier New" panose="02070309020205020404" pitchFamily="49" charset="0"/>
+              </a:rPr>
+              <a:t>	</a:t>
+            </a:r>
+            <a:r>
+              <a:rPr lang="en-US" dirty="0" err="1">
+                <a:solidFill>
+                  <a:srgbClr val="0033CC"/>
+                </a:solidFill>
+                <a:latin typeface="Courier New" panose="02070309020205020404" pitchFamily="49" charset="0"/>
+                <a:cs typeface="Courier New" panose="02070309020205020404" pitchFamily="49" charset="0"/>
+              </a:rPr>
+              <a:t>jupyter</a:t>
+            </a:r>
+            <a:r>
+              <a:rPr lang="en-US" dirty="0">
+                <a:solidFill>
+                  <a:srgbClr val="0033CC"/>
+                </a:solidFill>
+                <a:latin typeface="Courier New" panose="02070309020205020404" pitchFamily="49" charset="0"/>
+                <a:cs typeface="Courier New" panose="02070309020205020404" pitchFamily="49" charset="0"/>
+              </a:rPr>
+              <a:t> lab</a:t>
+            </a:r>
+            <a:br>
+              <a:rPr lang="en-US" dirty="0">
+                <a:latin typeface="+mn-lt"/>
+                <a:cs typeface="Courier New" panose="02070309020205020404" pitchFamily="49" charset="0"/>
+              </a:rPr>
+            </a:br>
+            <a:r>
+              <a:rPr lang="en-US" dirty="0">
+                <a:cs typeface="Courier New" panose="02070309020205020404" pitchFamily="49" charset="0"/>
+              </a:rPr>
+              <a:t>which should appear in your default browser. In </a:t>
+            </a:r>
+            <a:r>
+              <a:rPr lang="en-US" dirty="0" err="1">
+                <a:cs typeface="Courier New" panose="02070309020205020404" pitchFamily="49" charset="0"/>
+              </a:rPr>
+              <a:t>jupyterlab</a:t>
+            </a:r>
+            <a:r>
+              <a:rPr lang="en-US" dirty="0">
+                <a:cs typeface="Courier New" panose="02070309020205020404" pitchFamily="49" charset="0"/>
+              </a:rPr>
+              <a:t>, </a:t>
+            </a:r>
+            <a:r>
+              <a:rPr lang="en-US" dirty="0">
+                <a:latin typeface="+mn-lt"/>
+                <a:cs typeface="Courier New" panose="02070309020205020404" pitchFamily="49" charset="0"/>
+              </a:rPr>
+              <a:t>you should see the folder </a:t>
+            </a:r>
+            <a:r>
+              <a:rPr lang="en-US" b="1" dirty="0" err="1">
+                <a:solidFill>
+                  <a:srgbClr val="0033CC"/>
+                </a:solidFill>
+                <a:cs typeface="Courier New" panose="02070309020205020404" pitchFamily="49" charset="0"/>
+              </a:rPr>
+              <a:t>mlinphysics</a:t>
+            </a:r>
+            <a:r>
+              <a:rPr lang="en-US" b="1" dirty="0">
+                <a:solidFill>
+                  <a:srgbClr val="0033CC"/>
+                </a:solidFill>
+                <a:cs typeface="Courier New" panose="02070309020205020404" pitchFamily="49" charset="0"/>
+              </a:rPr>
+              <a:t> </a:t>
+            </a:r>
+            <a:r>
+              <a:rPr lang="en-US" dirty="0">
+                <a:latin typeface="+mn-lt"/>
+                <a:cs typeface="Courier New" panose="02070309020205020404" pitchFamily="49" charset="0"/>
+              </a:rPr>
+              <a:t>listed as a folder icon. </a:t>
+            </a:r>
+          </a:p>
+          <a:p>
+            <a:pPr marL="0" indent="0">
+              <a:buNone/>
+            </a:pPr>
+            <a:endParaRPr lang="en-US" dirty="0"/>
+          </a:p>
+          <a:p>
+            <a:pPr marL="457200" indent="-457200">
+              <a:buFont typeface="+mj-lt"/>
+              <a:buAutoNum type="arabicPeriod" startAt="2"/>
+            </a:pPr>
+            <a:endParaRPr lang="en-US" dirty="0"/>
+          </a:p>
+          <a:p>
+            <a:pPr marL="0" indent="0">
+              <a:buNone/>
+            </a:pPr>
+            <a:endParaRPr lang="en-US" dirty="0"/>
+          </a:p>
+          <a:p>
+            <a:pPr marL="0" indent="0">
+              <a:buNone/>
+            </a:pPr>
+            <a:endParaRPr lang="en-US" dirty="0"/>
+          </a:p>
+          <a:p>
+            <a:pPr marL="0" indent="0">
+              <a:buNone/>
+            </a:pPr>
+            <a:endParaRPr lang="en-US" dirty="0"/>
+          </a:p>
+          <a:p>
+            <a:pPr marL="0" indent="0">
+              <a:buNone/>
+            </a:pPr>
+            <a:endParaRPr lang="en-US" dirty="0"/>
+          </a:p>
+          <a:p>
+            <a:pPr marL="0" indent="0">
+              <a:buNone/>
+            </a:pPr>
+            <a:endParaRPr lang="en-US" dirty="0"/>
+          </a:p>
+        </p:txBody>
+      </p:sp>
+    </p:spTree>
+    <p:extLst>
+      <p:ext uri="{BB962C8B-B14F-4D97-AF65-F5344CB8AC3E}">
+        <p14:creationId xmlns:p14="http://schemas.microsoft.com/office/powerpoint/2010/main" val="173941447"/>
+      </p:ext>
+    </p:extLst>
+  </p:cSld>
+  <p:clrMapOvr>
+    <a:masterClrMapping/>
+  </p:clrMapOvr>
+  <mc:AlternateContent xmlns:mc="http://schemas.openxmlformats.org/markup-compatibility/2006" xmlns:p14="http://schemas.microsoft.com/office/powerpoint/2010/main">
+    <mc:Choice Requires="p14">
+      <p:transition spd="med" p14:dur="700">
+        <p:fade/>
+      </p:transition>
+    </mc:Choice>
+    <mc:Fallback xmlns="">
+      <p:transition spd="med">
+        <p:fade/>
+      </p:transition>
+    </mc:Fallback>
+  </mc:AlternateContent>
+</p:sld>
+</file>
+
+<file path=ppt/slides/slide6.xml><?xml version="1.0" encoding="utf-8"?>
+<p:sld xmlns:a="http://schemas.openxmlformats.org/drawingml/2006/main" xmlns:r="http://schemas.openxmlformats.org/officeDocument/2006/relationships" xmlns:p="http://schemas.openxmlformats.org/presentationml/2006/main">
+  <p:cSld>
+    <p:spTree>
+      <p:nvGrpSpPr>
+        <p:cNvPr id="1" name="">
+          <a:extLst>
+            <a:ext uri="{FF2B5EF4-FFF2-40B4-BE49-F238E27FC236}">
+              <a16:creationId xmlns:a16="http://schemas.microsoft.com/office/drawing/2014/main" id="{57ECC211-7552-7DA3-642E-6120669EFFD8}"/>
+            </a:ext>
+          </a:extLst>
+        </p:cNvPr>
+        <p:cNvGrpSpPr/>
+        <p:nvPr/>
+      </p:nvGrpSpPr>
+      <p:grpSpPr>
+        <a:xfrm>
+          <a:off x="0" y="0"/>
+          <a:ext cx="0" cy="0"/>
+          <a:chOff x="0" y="0"/>
+          <a:chExt cx="0" cy="0"/>
+        </a:xfrm>
+      </p:grpSpPr>
+      <p:sp>
+        <p:nvSpPr>
+          <p:cNvPr id="7" name="Title 6">
+            <a:extLst>
+              <a:ext uri="{FF2B5EF4-FFF2-40B4-BE49-F238E27FC236}">
+                <a16:creationId xmlns:a16="http://schemas.microsoft.com/office/drawing/2014/main" id="{C30C065E-8062-C697-88F9-A19E62C758BC}"/>
+              </a:ext>
+            </a:extLst>
+          </p:cNvPr>
+          <p:cNvSpPr>
+            <a:spLocks noGrp="1"/>
+          </p:cNvSpPr>
+          <p:nvPr>
+            <p:ph type="title"/>
+          </p:nvPr>
+        </p:nvSpPr>
+        <p:spPr/>
+        <p:txBody>
+          <a:bodyPr/>
+          <a:lstStyle/>
+          <a:p>
+            <a:r>
+              <a:rPr lang="en-US" dirty="0"/>
+              <a:t>Installation of </a:t>
+            </a:r>
+            <a:r>
+              <a:rPr lang="en-US" dirty="0" err="1">
+                <a:latin typeface="Courier New" panose="02070309020205020404" pitchFamily="49" charset="0"/>
+                <a:cs typeface="Courier New" panose="02070309020205020404" pitchFamily="49" charset="0"/>
+              </a:rPr>
+              <a:t>mlinphysics</a:t>
+            </a:r>
+            <a:endParaRPr lang="en-US" dirty="0">
+              <a:solidFill>
+                <a:schemeClr val="accent1"/>
+              </a:solidFill>
+              <a:latin typeface="Courier New" panose="02070309020205020404" pitchFamily="49" charset="0"/>
+              <a:cs typeface="Courier New" panose="02070309020205020404" pitchFamily="49" charset="0"/>
+            </a:endParaRPr>
+          </a:p>
+        </p:txBody>
+      </p:sp>
+      <p:sp>
+        <p:nvSpPr>
+          <p:cNvPr id="8" name="Content Placeholder 7">
+            <a:extLst>
+              <a:ext uri="{FF2B5EF4-FFF2-40B4-BE49-F238E27FC236}">
+                <a16:creationId xmlns:a16="http://schemas.microsoft.com/office/drawing/2014/main" id="{DFE6B6A3-D342-BB58-26FE-2B95DA378647}"/>
+              </a:ext>
+            </a:extLst>
+          </p:cNvPr>
+          <p:cNvSpPr>
+            <a:spLocks noGrp="1"/>
+          </p:cNvSpPr>
+          <p:nvPr>
+            <p:ph idx="1"/>
+          </p:nvPr>
+        </p:nvSpPr>
+        <p:spPr>
+          <a:xfrm>
+            <a:off x="266879" y="1295400"/>
+            <a:ext cx="8572321" cy="4819650"/>
+          </a:xfrm>
+        </p:spPr>
+        <p:txBody>
+          <a:bodyPr/>
+          <a:lstStyle/>
+          <a:p>
+            <a:pPr marL="0" indent="0">
+              <a:buNone/>
+            </a:pPr>
+            <a:r>
+              <a:rPr lang="en-US" dirty="0">
+                <a:latin typeface="+mn-lt"/>
+                <a:cs typeface="Courier New" panose="02070309020205020404" pitchFamily="49" charset="0"/>
+              </a:rPr>
+              <a:t>Please NOTE:</a:t>
+            </a:r>
+          </a:p>
+          <a:p>
+            <a:pPr marL="0" indent="0">
+              <a:buNone/>
+            </a:pPr>
+            <a:endParaRPr lang="en-US" dirty="0">
+              <a:latin typeface="+mn-lt"/>
+              <a:cs typeface="Courier New" panose="02070309020205020404" pitchFamily="49" charset="0"/>
+            </a:endParaRPr>
+          </a:p>
+          <a:p>
+            <a:pPr marL="457200" indent="-457200">
+              <a:buFont typeface="+mj-lt"/>
+              <a:buAutoNum type="arabicPeriod"/>
+            </a:pPr>
+            <a:r>
+              <a:rPr lang="en-US" dirty="0">
+                <a:latin typeface="+mn-lt"/>
+                <a:cs typeface="Courier New" panose="02070309020205020404" pitchFamily="49" charset="0"/>
+              </a:rPr>
+              <a:t>Work in your own folder (e.g., </a:t>
+            </a:r>
+            <a:r>
+              <a:rPr lang="en-US" dirty="0" err="1">
+                <a:latin typeface="+mn-lt"/>
+                <a:cs typeface="Courier New" panose="02070309020205020404" pitchFamily="49" charset="0"/>
+              </a:rPr>
+              <a:t>mlprojects</a:t>
+            </a:r>
+            <a:r>
+              <a:rPr lang="en-US" dirty="0">
+                <a:latin typeface="+mn-lt"/>
+                <a:cs typeface="Courier New" panose="02070309020205020404" pitchFamily="49" charset="0"/>
+              </a:rPr>
+              <a:t>), NOT in </a:t>
+            </a:r>
+            <a:r>
+              <a:rPr lang="en-US" b="1" dirty="0" err="1">
+                <a:solidFill>
+                  <a:srgbClr val="0033CC"/>
+                </a:solidFill>
+                <a:latin typeface="Courier New" panose="02070309020205020404" pitchFamily="49" charset="0"/>
+                <a:cs typeface="Courier New" panose="02070309020205020404" pitchFamily="49" charset="0"/>
+              </a:rPr>
+              <a:t>mlinphysics</a:t>
+            </a:r>
+            <a:r>
+              <a:rPr lang="en-US" dirty="0">
+                <a:latin typeface="+mn-lt"/>
+                <a:cs typeface="Courier New" panose="02070309020205020404" pitchFamily="49" charset="0"/>
+              </a:rPr>
+              <a:t>!</a:t>
+            </a:r>
+            <a:br>
+              <a:rPr lang="en-US" dirty="0">
+                <a:latin typeface="+mn-lt"/>
+                <a:cs typeface="Courier New" panose="02070309020205020404" pitchFamily="49" charset="0"/>
+              </a:rPr>
+            </a:br>
+            <a:endParaRPr lang="en-US" dirty="0">
+              <a:latin typeface="+mn-lt"/>
+              <a:cs typeface="Courier New" panose="02070309020205020404" pitchFamily="49" charset="0"/>
+            </a:endParaRPr>
+          </a:p>
+          <a:p>
+            <a:pPr marL="457200" indent="-457200">
+              <a:buFont typeface="+mj-lt"/>
+              <a:buAutoNum type="arabicPeriod"/>
+            </a:pPr>
+            <a:r>
+              <a:rPr lang="en-US" dirty="0">
+                <a:latin typeface="+mn-lt"/>
+                <a:cs typeface="Courier New" panose="02070309020205020404" pitchFamily="49" charset="0"/>
+              </a:rPr>
+              <a:t>The package </a:t>
+            </a:r>
+            <a:r>
+              <a:rPr lang="en-US" b="1" dirty="0" err="1">
+                <a:solidFill>
+                  <a:srgbClr val="0033CC"/>
+                </a:solidFill>
+                <a:latin typeface="Courier New" panose="02070309020205020404" pitchFamily="49" charset="0"/>
+                <a:cs typeface="Courier New" panose="02070309020205020404" pitchFamily="49" charset="0"/>
+              </a:rPr>
+              <a:t>mlinphysics</a:t>
+            </a:r>
+            <a:r>
+              <a:rPr lang="en-US" b="1" dirty="0">
+                <a:solidFill>
+                  <a:srgbClr val="0033CC"/>
+                </a:solidFill>
+                <a:latin typeface="Courier New" panose="02070309020205020404" pitchFamily="49" charset="0"/>
+                <a:cs typeface="Courier New" panose="02070309020205020404" pitchFamily="49" charset="0"/>
+              </a:rPr>
+              <a:t> </a:t>
+            </a:r>
+            <a:r>
+              <a:rPr lang="en-US" dirty="0">
+                <a:latin typeface="+mn-lt"/>
+                <a:cs typeface="Courier New" panose="02070309020205020404" pitchFamily="49" charset="0"/>
+              </a:rPr>
+              <a:t>is being restructured and improved, so code etc. could change without notice!</a:t>
+            </a:r>
+          </a:p>
+          <a:p>
+            <a:pPr marL="0" indent="0">
+              <a:buNone/>
+            </a:pPr>
+            <a:endParaRPr lang="en-US" dirty="0">
+              <a:latin typeface="+mn-lt"/>
+              <a:cs typeface="Courier New" panose="02070309020205020404" pitchFamily="49" charset="0"/>
+            </a:endParaRPr>
+          </a:p>
+          <a:p>
+            <a:pPr marL="0" indent="0">
+              <a:buNone/>
+            </a:pPr>
+            <a:endParaRPr lang="en-US" dirty="0"/>
+          </a:p>
+          <a:p>
+            <a:pPr marL="457200" indent="-457200">
+              <a:buFont typeface="+mj-lt"/>
+              <a:buAutoNum type="arabicPeriod" startAt="2"/>
+            </a:pPr>
+            <a:endParaRPr lang="en-US" dirty="0"/>
+          </a:p>
+          <a:p>
+            <a:pPr marL="0" indent="0">
+              <a:buNone/>
+            </a:pPr>
+            <a:endParaRPr lang="en-US" dirty="0"/>
+          </a:p>
+          <a:p>
+            <a:pPr marL="0" indent="0">
+              <a:buNone/>
+            </a:pPr>
+            <a:endParaRPr lang="en-US" dirty="0"/>
+          </a:p>
+          <a:p>
+            <a:pPr marL="0" indent="0">
+              <a:buNone/>
+            </a:pPr>
+            <a:endParaRPr lang="en-US" dirty="0"/>
+          </a:p>
+          <a:p>
+            <a:pPr marL="0" indent="0">
+              <a:buNone/>
+            </a:pPr>
+            <a:endParaRPr lang="en-US" dirty="0"/>
+          </a:p>
+          <a:p>
+            <a:pPr marL="0" indent="0">
+              <a:buNone/>
+            </a:pPr>
+            <a:endParaRPr lang="en-US" dirty="0"/>
+          </a:p>
+        </p:txBody>
+      </p:sp>
+    </p:spTree>
+    <p:extLst>
+      <p:ext uri="{BB962C8B-B14F-4D97-AF65-F5344CB8AC3E}">
+        <p14:creationId xmlns:p14="http://schemas.microsoft.com/office/powerpoint/2010/main" val="1196402265"/>
+      </p:ext>
+    </p:extLst>
+  </p:cSld>
+  <p:clrMapOvr>
+    <a:masterClrMapping/>
+  </p:clrMapOvr>
+  <mc:AlternateContent xmlns:mc="http://schemas.openxmlformats.org/markup-compatibility/2006" xmlns:p14="http://schemas.microsoft.com/office/powerpoint/2010/main">
+    <mc:Choice Requires="p14">
+      <p:transition spd="med" p14:dur="700">
+        <p:fade/>
+      </p:transition>
+    </mc:Choice>
+    <mc:Fallback xmlns="">
+      <p:transition spd="med">
+        <p:fade/>
+      </p:transition>
+    </mc:Fallback>
+  </mc:AlternateContent>
+</p:sld>
+</file>
+
+<file path=ppt/slides/slide7.xml><?xml version="1.0" encoding="utf-8"?>
+<p:sld xmlns:a="http://schemas.openxmlformats.org/drawingml/2006/main" xmlns:r="http://schemas.openxmlformats.org/officeDocument/2006/relationships" xmlns:p="http://schemas.openxmlformats.org/presentationml/2006/main">
+  <p:cSld>
+    <p:spTree>
+      <p:nvGrpSpPr>
+        <p:cNvPr id="1" name="">
+          <a:extLst>
+            <a:ext uri="{FF2B5EF4-FFF2-40B4-BE49-F238E27FC236}">
+              <a16:creationId xmlns:a16="http://schemas.microsoft.com/office/drawing/2014/main" id="{1678E114-7DC0-8689-A29F-754074E7FC00}"/>
+            </a:ext>
+          </a:extLst>
+        </p:cNvPr>
+        <p:cNvGrpSpPr/>
+        <p:nvPr/>
+      </p:nvGrpSpPr>
+      <p:grpSpPr>
+        <a:xfrm>
+          <a:off x="0" y="0"/>
+          <a:ext cx="0" cy="0"/>
+          <a:chOff x="0" y="0"/>
+          <a:chExt cx="0" cy="0"/>
+        </a:xfrm>
+      </p:grpSpPr>
+      <p:sp>
+        <p:nvSpPr>
+          <p:cNvPr id="7" name="Title 6">
+            <a:extLst>
+              <a:ext uri="{FF2B5EF4-FFF2-40B4-BE49-F238E27FC236}">
+                <a16:creationId xmlns:a16="http://schemas.microsoft.com/office/drawing/2014/main" id="{7922FE8C-92BD-DFD2-4429-DA1C815F97DD}"/>
+              </a:ext>
+            </a:extLst>
+          </p:cNvPr>
+          <p:cNvSpPr>
+            <a:spLocks noGrp="1"/>
+          </p:cNvSpPr>
+          <p:nvPr>
+            <p:ph type="title"/>
+          </p:nvPr>
+        </p:nvSpPr>
+        <p:spPr/>
+        <p:txBody>
+          <a:bodyPr/>
+          <a:lstStyle/>
+          <a:p>
+            <a:r>
+              <a:rPr lang="en-US" dirty="0"/>
+              <a:t>Tutorial 	1</a:t>
+            </a:r>
+            <a:endParaRPr lang="en-US" dirty="0">
+              <a:solidFill>
+                <a:schemeClr val="accent1"/>
+              </a:solidFill>
+            </a:endParaRPr>
+          </a:p>
+        </p:txBody>
+      </p:sp>
+      <p:sp>
+        <p:nvSpPr>
+          <p:cNvPr id="8" name="Content Placeholder 7">
+            <a:extLst>
+              <a:ext uri="{FF2B5EF4-FFF2-40B4-BE49-F238E27FC236}">
+                <a16:creationId xmlns:a16="http://schemas.microsoft.com/office/drawing/2014/main" id="{5583C0B7-2D0F-A536-3C97-1396C58941FD}"/>
               </a:ext>
             </a:extLst>
           </p:cNvPr>
@@ -4432,11 +5260,41 @@
                 <a:latin typeface="+mn-lt"/>
                 <a:cs typeface="Courier New" panose="02070309020205020404" pitchFamily="49" charset="0"/>
               </a:rPr>
-              <a:t>Download the following notebooks from canvas:</a:t>
-            </a:r>
-          </a:p>
-          <a:p>
-            <a:pPr marL="857250" lvl="1" indent="-457200"/>
+              <a:t>Copy the following notebooks from </a:t>
+            </a:r>
+            <a:r>
+              <a:rPr lang="en-US" b="1" dirty="0" err="1">
+                <a:solidFill>
+                  <a:srgbClr val="0033CC"/>
+                </a:solidFill>
+                <a:latin typeface="Courier New" panose="02070309020205020404" pitchFamily="49" charset="0"/>
+                <a:cs typeface="Courier New" panose="02070309020205020404" pitchFamily="49" charset="0"/>
+              </a:rPr>
+              <a:t>mlinphysics</a:t>
+            </a:r>
+            <a:r>
+              <a:rPr lang="en-US" b="1" dirty="0">
+                <a:solidFill>
+                  <a:srgbClr val="0033CC"/>
+                </a:solidFill>
+                <a:latin typeface="Courier New" panose="02070309020205020404" pitchFamily="49" charset="0"/>
+                <a:cs typeface="Courier New" panose="02070309020205020404" pitchFamily="49" charset="0"/>
+              </a:rPr>
+              <a:t> </a:t>
+            </a:r>
+            <a:r>
+              <a:rPr lang="en-US" dirty="0">
+                <a:latin typeface="+mn-lt"/>
+                <a:cs typeface="Courier New" panose="02070309020205020404" pitchFamily="49" charset="0"/>
+              </a:rPr>
+              <a:t>to your working folder</a:t>
+            </a:r>
+          </a:p>
+          <a:p>
+            <a:pPr marL="857250" lvl="1" indent="-457200">
+              <a:buFont typeface="+mj-lt"/>
+              <a:buAutoNum type="arabicPeriod"/>
+            </a:pPr>
             <a:r>
               <a:rPr lang="en-US" dirty="0" err="1">
                 <a:solidFill>
@@ -4459,7 +5317,10 @@
             </a:r>
           </a:p>
           <a:p>
-            <a:pPr marL="857250" lvl="1" indent="-457200"/>
+            <a:pPr marL="857250" lvl="1" indent="-457200">
+              <a:buFont typeface="+mj-lt"/>
+              <a:buAutoNum type="arabicPeriod"/>
+            </a:pPr>
             <a:r>
               <a:rPr lang="en-US" dirty="0">
                 <a:solidFill>
@@ -4472,7 +5333,10 @@
             </a:r>
           </a:p>
           <a:p>
-            <a:pPr marL="857250" lvl="1" indent="-457200"/>
+            <a:pPr marL="857250" lvl="1" indent="-457200">
+              <a:buFont typeface="+mj-lt"/>
+              <a:buAutoNum type="arabicPeriod"/>
+            </a:pPr>
             <a:r>
               <a:rPr lang="en-US" dirty="0">
                 <a:solidFill>
@@ -4480,20 +5344,31 @@
                 </a:solidFill>
                 <a:cs typeface="Courier New" panose="02070309020205020404" pitchFamily="49" charset="0"/>
               </a:rPr>
-              <a:t>python_minimum_part2.ipynb</a:t>
-            </a:r>
-          </a:p>
-          <a:p>
-            <a:pPr marL="857250" lvl="1" indent="-457200"/>
-            <a:r>
-              <a:rPr lang="en-US" dirty="0">
-                <a:solidFill>
-                  <a:srgbClr val="0033CC"/>
-                </a:solidFill>
-                <a:cs typeface="Courier New" panose="02070309020205020404" pitchFamily="49" charset="0"/>
-              </a:rPr>
-              <a:t>tutorial01.ipynb</a:t>
-            </a:r>
+              <a:t>python_minimum_part2</a:t>
+            </a:r>
+            <a:r>
+              <a:rPr lang="en-US">
+                <a:solidFill>
+                  <a:srgbClr val="0033CC"/>
+                </a:solidFill>
+                <a:cs typeface="Courier New" panose="02070309020205020404" pitchFamily="49" charset="0"/>
+              </a:rPr>
+              <a:t>.ipynb</a:t>
+            </a:r>
+            <a:br>
+              <a:rPr lang="en-US">
+                <a:solidFill>
+                  <a:srgbClr val="0033CC"/>
+                </a:solidFill>
+                <a:cs typeface="Courier New" panose="02070309020205020404" pitchFamily="49" charset="0"/>
+              </a:rPr>
+            </a:br>
+            <a:endParaRPr lang="en-US" dirty="0">
+              <a:solidFill>
+                <a:srgbClr val="0033CC"/>
+              </a:solidFill>
+              <a:cs typeface="Courier New" panose="02070309020205020404" pitchFamily="49" charset="0"/>
+            </a:endParaRPr>
           </a:p>
           <a:p>
             <a:pPr marL="457200" indent="-457200">
@@ -4505,25 +5380,25 @@
                 <a:latin typeface="+mn-lt"/>
                 <a:cs typeface="Courier New" panose="02070309020205020404" pitchFamily="49" charset="0"/>
               </a:rPr>
-              <a:t>Test your installation by executing the </a:t>
+              <a:t>In your </a:t>
             </a:r>
             <a:r>
               <a:rPr lang="en-US" dirty="0" err="1">
                 <a:latin typeface="+mn-lt"/>
                 <a:cs typeface="Courier New" panose="02070309020205020404" pitchFamily="49" charset="0"/>
               </a:rPr>
-              <a:t>test.ipynb</a:t>
+              <a:t>jupyterlab</a:t>
             </a:r>
             <a:r>
               <a:rPr lang="en-US" dirty="0">
                 <a:latin typeface="+mn-lt"/>
                 <a:cs typeface="Courier New" panose="02070309020205020404" pitchFamily="49" charset="0"/>
               </a:rPr>
-              <a:t> notebook.</a:t>
-            </a:r>
-          </a:p>
-          <a:p>
-            <a:pPr marL="457200" indent="-457200">
+              <a:t> environment: </a:t>
+            </a:r>
+          </a:p>
+          <a:p>
+            <a:pPr marL="857250" lvl="1" indent="-457200">
               <a:buFont typeface="+mj-lt"/>
               <a:buAutoNum type="arabicPeriod"/>
             </a:pPr>
@@ -4532,7 +5407,34 @@
                 <a:latin typeface="+mn-lt"/>
                 <a:cs typeface="Courier New" panose="02070309020205020404" pitchFamily="49" charset="0"/>
               </a:rPr>
-              <a:t>Then go through the python minimum tutorials </a:t>
+              <a:t>Test your installation by executing the </a:t>
+            </a:r>
+            <a:r>
+              <a:rPr lang="en-US" dirty="0" err="1">
+                <a:latin typeface="+mn-lt"/>
+                <a:cs typeface="Courier New" panose="02070309020205020404" pitchFamily="49" charset="0"/>
+              </a:rPr>
+              <a:t>test.ipynb</a:t>
+            </a:r>
+            <a:r>
+              <a:rPr lang="en-US" dirty="0">
+                <a:latin typeface="+mn-lt"/>
+                <a:cs typeface="Courier New" panose="02070309020205020404" pitchFamily="49" charset="0"/>
+              </a:rPr>
+              <a:t> notebook.</a:t>
+            </a:r>
+          </a:p>
+          <a:p>
+            <a:pPr marL="857250" lvl="1" indent="-457200">
+              <a:buFont typeface="+mj-lt"/>
+              <a:buAutoNum type="arabicPeriod"/>
+            </a:pPr>
+            <a:r>
+              <a:rPr lang="en-US" dirty="0">
+                <a:latin typeface="+mn-lt"/>
+                <a:cs typeface="Courier New" panose="02070309020205020404" pitchFamily="49" charset="0"/>
+              </a:rPr>
+              <a:t>Work through the python minimum tutorials </a:t>
             </a:r>
             <a:r>
               <a:rPr lang="en-US" i="1" dirty="0">
@@ -4547,36 +5449,6 @@
                 <a:cs typeface="Courier New" panose="02070309020205020404" pitchFamily="49" charset="0"/>
               </a:rPr>
               <a:t> and try to understand what each line or set of lines does. </a:t>
-            </a:r>
-          </a:p>
-          <a:p>
-            <a:pPr marL="457200" indent="-457200">
-              <a:buFont typeface="+mj-lt"/>
-              <a:buAutoNum type="arabicPeriod"/>
-            </a:pPr>
-            <a:r>
-              <a:rPr lang="en-US" dirty="0">
-                <a:latin typeface="+mn-lt"/>
-                <a:cs typeface="Courier New" panose="02070309020205020404" pitchFamily="49" charset="0"/>
-              </a:rPr>
-              <a:t>Then work through </a:t>
-            </a:r>
-            <a:r>
-              <a:rPr lang="en-US" dirty="0">
-                <a:solidFill>
-                  <a:srgbClr val="0033CC"/>
-                </a:solidFill>
-                <a:latin typeface="+mn-lt"/>
-                <a:cs typeface="Courier New" panose="02070309020205020404" pitchFamily="49" charset="0"/>
-              </a:rPr>
-              <a:t>tutorial01.ipynb</a:t>
-            </a:r>
-            <a:r>
-              <a:rPr lang="en-US" dirty="0">
-                <a:latin typeface="+mn-lt"/>
-                <a:cs typeface="Courier New" panose="02070309020205020404" pitchFamily="49" charset="0"/>
-              </a:rPr>
-              <a:t> before the next class.</a:t>
             </a:r>
           </a:p>
           <a:p>
@@ -4640,7 +5512,7 @@
     </p:spTree>
     <p:extLst>
       <p:ext uri="{BB962C8B-B14F-4D97-AF65-F5344CB8AC3E}">
-        <p14:creationId xmlns:p14="http://schemas.microsoft.com/office/powerpoint/2010/main" val="629426549"/>
+        <p14:creationId xmlns:p14="http://schemas.microsoft.com/office/powerpoint/2010/main" val="1331659483"/>
       </p:ext>
     </p:extLst>
   </p:cSld>

</xml_diff>